<commit_message>
Tiny edits to Snell's law
</commit_message>
<xml_diff>
--- a/StudentGuideModule2/deriving_snells_law/deriving_snell.pptx
+++ b/StudentGuideModule2/deriving_snells_law/deriving_snell.pptx
@@ -107,6 +107,11 @@
       </a:defRPr>
     </a:lvl9pPr>
   </p:defaultTextStyle>
+  <p:extLst>
+    <p:ext uri="{EFAFB233-063F-42B5-8137-9DF3F51BA10A}">
+      <p15:sldGuideLst xmlns:p15="http://schemas.microsoft.com/office/powerpoint/2012/main"/>
+    </p:ext>
+  </p:extLst>
 </p:presentation>
 </file>
 
@@ -192,7 +197,7 @@
           <a:p>
             <a:fld id="{5D4A7C9B-BC28-4F1E-862A-C4D0FF41BEC5}" type="datetimeFigureOut">
               <a:rPr lang="en-US" smtClean="0"/>
-              <a:t>12/5/2017</a:t>
+              <a:t>11/13/2019</a:t>
             </a:fld>
             <a:endParaRPr lang="en-US"/>
           </a:p>
@@ -675,7 +680,7 @@
           <a:p>
             <a:fld id="{96DADB6F-2D36-4A3E-A8B2-186C67720820}" type="datetimeFigureOut">
               <a:rPr lang="en-US" smtClean="0"/>
-              <a:t>12/5/2017</a:t>
+              <a:t>11/13/2019</a:t>
             </a:fld>
             <a:endParaRPr lang="en-US"/>
           </a:p>
@@ -845,7 +850,7 @@
           <a:p>
             <a:fld id="{96DADB6F-2D36-4A3E-A8B2-186C67720820}" type="datetimeFigureOut">
               <a:rPr lang="en-US" smtClean="0"/>
-              <a:t>12/5/2017</a:t>
+              <a:t>11/13/2019</a:t>
             </a:fld>
             <a:endParaRPr lang="en-US"/>
           </a:p>
@@ -1025,7 +1030,7 @@
           <a:p>
             <a:fld id="{96DADB6F-2D36-4A3E-A8B2-186C67720820}" type="datetimeFigureOut">
               <a:rPr lang="en-US" smtClean="0"/>
-              <a:t>12/5/2017</a:t>
+              <a:t>11/13/2019</a:t>
             </a:fld>
             <a:endParaRPr lang="en-US"/>
           </a:p>
@@ -1195,7 +1200,7 @@
           <a:p>
             <a:fld id="{96DADB6F-2D36-4A3E-A8B2-186C67720820}" type="datetimeFigureOut">
               <a:rPr lang="en-US" smtClean="0"/>
-              <a:t>12/5/2017</a:t>
+              <a:t>11/13/2019</a:t>
             </a:fld>
             <a:endParaRPr lang="en-US"/>
           </a:p>
@@ -1439,7 +1444,7 @@
           <a:p>
             <a:fld id="{96DADB6F-2D36-4A3E-A8B2-186C67720820}" type="datetimeFigureOut">
               <a:rPr lang="en-US" smtClean="0"/>
-              <a:t>12/5/2017</a:t>
+              <a:t>11/13/2019</a:t>
             </a:fld>
             <a:endParaRPr lang="en-US"/>
           </a:p>
@@ -1671,7 +1676,7 @@
           <a:p>
             <a:fld id="{96DADB6F-2D36-4A3E-A8B2-186C67720820}" type="datetimeFigureOut">
               <a:rPr lang="en-US" smtClean="0"/>
-              <a:t>12/5/2017</a:t>
+              <a:t>11/13/2019</a:t>
             </a:fld>
             <a:endParaRPr lang="en-US"/>
           </a:p>
@@ -2038,7 +2043,7 @@
           <a:p>
             <a:fld id="{96DADB6F-2D36-4A3E-A8B2-186C67720820}" type="datetimeFigureOut">
               <a:rPr lang="en-US" smtClean="0"/>
-              <a:t>12/5/2017</a:t>
+              <a:t>11/13/2019</a:t>
             </a:fld>
             <a:endParaRPr lang="en-US"/>
           </a:p>
@@ -2156,7 +2161,7 @@
           <a:p>
             <a:fld id="{96DADB6F-2D36-4A3E-A8B2-186C67720820}" type="datetimeFigureOut">
               <a:rPr lang="en-US" smtClean="0"/>
-              <a:t>12/5/2017</a:t>
+              <a:t>11/13/2019</a:t>
             </a:fld>
             <a:endParaRPr lang="en-US"/>
           </a:p>
@@ -2251,7 +2256,7 @@
           <a:p>
             <a:fld id="{96DADB6F-2D36-4A3E-A8B2-186C67720820}" type="datetimeFigureOut">
               <a:rPr lang="en-US" smtClean="0"/>
-              <a:t>12/5/2017</a:t>
+              <a:t>11/13/2019</a:t>
             </a:fld>
             <a:endParaRPr lang="en-US"/>
           </a:p>
@@ -2528,7 +2533,7 @@
           <a:p>
             <a:fld id="{96DADB6F-2D36-4A3E-A8B2-186C67720820}" type="datetimeFigureOut">
               <a:rPr lang="en-US" smtClean="0"/>
-              <a:t>12/5/2017</a:t>
+              <a:t>11/13/2019</a:t>
             </a:fld>
             <a:endParaRPr lang="en-US"/>
           </a:p>
@@ -2785,7 +2790,7 @@
           <a:p>
             <a:fld id="{96DADB6F-2D36-4A3E-A8B2-186C67720820}" type="datetimeFigureOut">
               <a:rPr lang="en-US" smtClean="0"/>
-              <a:t>12/5/2017</a:t>
+              <a:t>11/13/2019</a:t>
             </a:fld>
             <a:endParaRPr lang="en-US"/>
           </a:p>
@@ -2998,7 +3003,7 @@
           <a:p>
             <a:fld id="{96DADB6F-2D36-4A3E-A8B2-186C67720820}" type="datetimeFigureOut">
               <a:rPr lang="en-US" smtClean="0"/>
-              <a:t>12/5/2017</a:t>
+              <a:t>11/13/2019</a:t>
             </a:fld>
             <a:endParaRPr lang="en-US"/>
           </a:p>
@@ -3497,8 +3502,8 @@
           </a:p>
         </p:txBody>
       </p:sp>
-      <mc:AlternateContent xmlns:mc="http://schemas.openxmlformats.org/markup-compatibility/2006">
-        <mc:Choice xmlns:a14="http://schemas.microsoft.com/office/drawing/2010/main" Requires="a14">
+      <mc:AlternateContent xmlns:mc="http://schemas.openxmlformats.org/markup-compatibility/2006" xmlns:a14="http://schemas.microsoft.com/office/drawing/2010/main">
+        <mc:Choice Requires="a14">
           <p:sp>
             <p:nvSpPr>
               <p:cNvPr id="16" name="TextBox 15" hidden="1"/>
@@ -3521,6 +3526,7 @@
               </a:bodyPr>
               <a:lstStyle/>
               <a:p>
+                <a:pPr/>
                 <a14:m>
                   <m:oMathPara xmlns:m="http://schemas.openxmlformats.org/officeDocument/2006/math">
                     <m:oMathParaPr>
@@ -3572,7 +3578,7 @@
             </p:txBody>
           </p:sp>
         </mc:Choice>
-        <mc:Fallback>
+        <mc:Fallback xmlns="">
           <p:sp>
             <p:nvSpPr>
               <p:cNvPr id="16" name="TextBox 15" hidden="1"/>
@@ -3779,7 +3785,7 @@
         </p:nvGrpSpPr>
         <p:grpSpPr>
           <a:xfrm>
-            <a:off x="2304469" y="2234077"/>
+            <a:off x="2304469" y="2230267"/>
             <a:ext cx="3047727" cy="2307055"/>
             <a:chOff x="2304469" y="2234077"/>
             <a:chExt cx="2282771" cy="1728002"/>
@@ -3901,8 +3907,8 @@
             </a:p>
           </p:txBody>
         </p:sp>
-        <mc:AlternateContent xmlns:mc="http://schemas.openxmlformats.org/markup-compatibility/2006">
-          <mc:Choice xmlns:a14="http://schemas.microsoft.com/office/drawing/2010/main" Requires="a14">
+        <mc:AlternateContent xmlns:mc="http://schemas.openxmlformats.org/markup-compatibility/2006" xmlns:a14="http://schemas.microsoft.com/office/drawing/2010/main">
+          <mc:Choice Requires="a14">
             <p:sp>
               <p:nvSpPr>
                 <p:cNvPr id="39" name="TextBox 38"/>
@@ -3925,6 +3931,7 @@
                 </a:bodyPr>
                 <a:lstStyle/>
                 <a:p>
+                  <a:pPr/>
                   <a14:m>
                     <m:oMathPara xmlns:m="http://schemas.openxmlformats.org/officeDocument/2006/math">
                       <m:oMathParaPr>
@@ -3964,7 +3971,7 @@
               </p:txBody>
             </p:sp>
           </mc:Choice>
-          <mc:Fallback>
+          <mc:Fallback xmlns="">
             <p:sp>
               <p:nvSpPr>
                 <p:cNvPr id="39" name="TextBox 38"/>
@@ -4003,8 +4010,8 @@
             </p:sp>
           </mc:Fallback>
         </mc:AlternateContent>
-        <mc:AlternateContent xmlns:mc="http://schemas.openxmlformats.org/markup-compatibility/2006">
-          <mc:Choice xmlns:a14="http://schemas.microsoft.com/office/drawing/2010/main" Requires="a14">
+        <mc:AlternateContent xmlns:mc="http://schemas.openxmlformats.org/markup-compatibility/2006" xmlns:a14="http://schemas.microsoft.com/office/drawing/2010/main">
+          <mc:Choice Requires="a14">
             <p:sp>
               <p:nvSpPr>
                 <p:cNvPr id="42" name="TextBox 41"/>
@@ -4027,6 +4034,7 @@
                 </a:bodyPr>
                 <a:lstStyle/>
                 <a:p>
+                  <a:pPr/>
                   <a14:m>
                     <m:oMathPara xmlns:m="http://schemas.openxmlformats.org/officeDocument/2006/math">
                       <m:oMathParaPr>
@@ -4066,7 +4074,7 @@
               </p:txBody>
             </p:sp>
           </mc:Choice>
-          <mc:Fallback>
+          <mc:Fallback xmlns="">
             <p:sp>
               <p:nvSpPr>
                 <p:cNvPr id="42" name="TextBox 41"/>
@@ -4105,8 +4113,8 @@
             </p:sp>
           </mc:Fallback>
         </mc:AlternateContent>
-        <mc:AlternateContent xmlns:mc="http://schemas.openxmlformats.org/markup-compatibility/2006">
-          <mc:Choice xmlns:a14="http://schemas.microsoft.com/office/drawing/2010/main" Requires="a14">
+        <mc:AlternateContent xmlns:mc="http://schemas.openxmlformats.org/markup-compatibility/2006" xmlns:a14="http://schemas.microsoft.com/office/drawing/2010/main">
+          <mc:Choice Requires="a14">
             <p:sp>
               <p:nvSpPr>
                 <p:cNvPr id="43" name="TextBox 42"/>
@@ -4129,6 +4137,7 @@
                 </a:bodyPr>
                 <a:lstStyle/>
                 <a:p>
+                  <a:pPr/>
                   <a14:m>
                     <m:oMathPara xmlns:m="http://schemas.openxmlformats.org/officeDocument/2006/math">
                       <m:oMathParaPr>
@@ -4168,7 +4177,7 @@
               </p:txBody>
             </p:sp>
           </mc:Choice>
-          <mc:Fallback>
+          <mc:Fallback xmlns="">
             <p:sp>
               <p:nvSpPr>
                 <p:cNvPr id="43" name="TextBox 42"/>
@@ -4398,8 +4407,8 @@
           </p:nvCxnSpPr>
           <p:spPr>
             <a:xfrm flipV="1">
-              <a:off x="2323870" y="3159406"/>
-              <a:ext cx="1896355" cy="409777"/>
+              <a:off x="2323870" y="3158735"/>
+              <a:ext cx="1883787" cy="410449"/>
             </a:xfrm>
             <a:prstGeom prst="line">
               <a:avLst/>
@@ -4437,8 +4446,8 @@
           </p:nvCxnSpPr>
           <p:spPr>
             <a:xfrm>
-              <a:off x="3033158" y="3172740"/>
-              <a:ext cx="83733" cy="406013"/>
+              <a:off x="3029985" y="3166743"/>
+              <a:ext cx="50226" cy="233953"/>
             </a:xfrm>
             <a:prstGeom prst="straightConnector1">
               <a:avLst/>
@@ -4475,8 +4484,8 @@
           </p:nvCxnSpPr>
           <p:spPr>
             <a:xfrm>
-              <a:off x="2484450" y="2334259"/>
-              <a:ext cx="540266" cy="826821"/>
+              <a:off x="2650420" y="2588258"/>
+              <a:ext cx="374296" cy="572822"/>
             </a:xfrm>
             <a:prstGeom prst="straightConnector1">
               <a:avLst/>
@@ -4605,8 +4614,8 @@
           </p:nvCxnSpPr>
           <p:spPr>
             <a:xfrm>
-              <a:off x="3116891" y="3578753"/>
-              <a:ext cx="74406" cy="360787"/>
+              <a:off x="3080040" y="3402036"/>
+              <a:ext cx="111257" cy="537504"/>
             </a:xfrm>
             <a:prstGeom prst="straightConnector1">
               <a:avLst/>
@@ -4684,7 +4693,7 @@
               </p:nvSpPr>
               <p:spPr>
                 <a:xfrm>
-                  <a:off x="2955844" y="3189839"/>
+                  <a:off x="2946377" y="3166028"/>
                   <a:ext cx="340910" cy="253916"/>
                 </a:xfrm>
                 <a:prstGeom prst="rect">
@@ -4698,6 +4707,7 @@
                 </a:bodyPr>
                 <a:lstStyle/>
                 <a:p>
+                  <a:pPr/>
                   <a14:m>
                     <m:oMathPara xmlns:m="http://schemas.openxmlformats.org/officeDocument/2006/math">
                       <m:oMathParaPr>
@@ -4748,7 +4758,7 @@
               </p:nvSpPr>
               <p:spPr>
                 <a:xfrm>
-                  <a:off x="2955844" y="3189839"/>
+                  <a:off x="2946377" y="3166028"/>
                   <a:ext cx="340910" cy="253916"/>
                 </a:xfrm>
                 <a:prstGeom prst="rect">
@@ -4776,8 +4786,8 @@
             </p:sp>
           </mc:Fallback>
         </mc:AlternateContent>
-        <mc:AlternateContent xmlns:mc="http://schemas.openxmlformats.org/markup-compatibility/2006">
-          <mc:Choice xmlns:a14="http://schemas.microsoft.com/office/drawing/2010/main" Requires="a14">
+        <mc:AlternateContent xmlns:mc="http://schemas.openxmlformats.org/markup-compatibility/2006" xmlns:a14="http://schemas.microsoft.com/office/drawing/2010/main">
+          <mc:Choice Requires="a14">
             <p:sp>
               <p:nvSpPr>
                 <p:cNvPr id="137" name="TextBox 136"/>
@@ -4800,6 +4810,7 @@
                 </a:bodyPr>
                 <a:lstStyle/>
                 <a:p>
+                  <a:pPr/>
                   <a14:m>
                     <m:oMathPara xmlns:m="http://schemas.openxmlformats.org/officeDocument/2006/math">
                       <m:oMathParaPr>
@@ -4839,7 +4850,7 @@
               </p:txBody>
             </p:sp>
           </mc:Choice>
-          <mc:Fallback>
+          <mc:Fallback xmlns="">
             <p:sp>
               <p:nvSpPr>
                 <p:cNvPr id="137" name="TextBox 136"/>
@@ -4878,8 +4889,8 @@
             </p:sp>
           </mc:Fallback>
         </mc:AlternateContent>
-        <mc:AlternateContent xmlns:mc="http://schemas.openxmlformats.org/markup-compatibility/2006">
-          <mc:Choice xmlns:a14="http://schemas.microsoft.com/office/drawing/2010/main" Requires="a14">
+        <mc:AlternateContent xmlns:mc="http://schemas.openxmlformats.org/markup-compatibility/2006" xmlns:a14="http://schemas.microsoft.com/office/drawing/2010/main">
+          <mc:Choice Requires="a14">
             <p:sp>
               <p:nvSpPr>
                 <p:cNvPr id="138" name="TextBox 137"/>
@@ -4902,6 +4913,7 @@
                 </a:bodyPr>
                 <a:lstStyle/>
                 <a:p>
+                  <a:pPr/>
                   <a14:m>
                     <m:oMathPara xmlns:m="http://schemas.openxmlformats.org/officeDocument/2006/math">
                       <m:oMathParaPr>
@@ -4941,7 +4953,7 @@
               </p:txBody>
             </p:sp>
           </mc:Choice>
-          <mc:Fallback>
+          <mc:Fallback xmlns="">
             <p:sp>
               <p:nvSpPr>
                 <p:cNvPr id="138" name="TextBox 137"/>

</xml_diff>